<commit_message>
update to new sponsors and content license
</commit_message>
<xml_diff>
--- a/assets/lectures/cbw/2024/full/RNASeq_Module0_Introductions.pptx
+++ b/assets/lectures/cbw/2024/full/RNASeq_Module0_Introductions.pptx
@@ -4073,7 +4073,13 @@
       </p:grpSpPr>
       <p:pic>
         <p:nvPicPr>
-          <p:cNvPr id="75" name="Google Shape;75;p2" descr="Picture 1.png"/>
+          <p:cNvPr id="2" name="Google Shape;131;p2">
+            <a:extLst>
+              <a:ext uri="{FF2B5EF4-FFF2-40B4-BE49-F238E27FC236}">
+                <a16:creationId xmlns:a16="http://schemas.microsoft.com/office/drawing/2014/main" id="{C525469F-D12C-306E-6398-1EB223E48039}"/>
+              </a:ext>
+            </a:extLst>
+          </p:cNvPr>
           <p:cNvPicPr preferRelativeResize="0"/>
           <p:nvPr/>
         </p:nvPicPr>
@@ -4086,8 +4092,8 @@
         </p:blipFill>
         <p:spPr>
           <a:xfrm>
-            <a:off x="3135984" y="290447"/>
-            <a:ext cx="5920032" cy="5813143"/>
+            <a:off x="4095918" y="260648"/>
+            <a:ext cx="4000165" cy="6003046"/>
           </a:xfrm>
           <a:prstGeom prst="rect">
             <a:avLst/>
@@ -6277,14 +6283,20 @@
       </p:sp>
       <p:sp>
         <p:nvSpPr>
-          <p:cNvPr id="96" name="Google Shape;96;p5"/>
+          <p:cNvPr id="2" name="Google Shape;159;g24c7d206a1c_1_72">
+            <a:extLst>
+              <a:ext uri="{FF2B5EF4-FFF2-40B4-BE49-F238E27FC236}">
+                <a16:creationId xmlns:a16="http://schemas.microsoft.com/office/drawing/2014/main" id="{627D07C6-EEF4-80F8-EC18-18951656C9DA}"/>
+              </a:ext>
+            </a:extLst>
+          </p:cNvPr>
           <p:cNvSpPr txBox="1"/>
           <p:nvPr/>
         </p:nvSpPr>
         <p:spPr>
           <a:xfrm>
-            <a:off x="2148067" y="3832139"/>
-            <a:ext cx="7951574" cy="300082"/>
+            <a:off x="2117124" y="3832139"/>
+            <a:ext cx="7951500" cy="300000"/>
           </a:xfrm>
           <a:prstGeom prst="rect">
             <a:avLst/>
@@ -6300,11 +6312,25 @@
           </a:bodyPr>
           <a:lstStyle/>
           <a:p>
-            <a:pPr algn="ctr">
+            <a:pPr marL="0" marR="0" lvl="0" indent="0" algn="ctr" rtl="0">
+              <a:lnSpc>
+                <a:spcPct val="100000"/>
+              </a:lnSpc>
+              <a:spcBef>
+                <a:spcPts val="0"/>
+              </a:spcBef>
+              <a:spcAft>
+                <a:spcPts val="0"/>
+              </a:spcAft>
+              <a:buClr>
+                <a:srgbClr val="000000"/>
+              </a:buClr>
               <a:buSzPts val="1350"/>
+              <a:buFont typeface="Arial"/>
+              <a:buNone/>
             </a:pPr>
             <a:r>
-              <a:rPr lang="en-US" sz="1350" dirty="0">
+              <a:rPr lang="en-US" sz="1350" b="0" i="0" u="none" strike="noStrike" cap="none">
                 <a:solidFill>
                   <a:schemeClr val="dk1"/>
                 </a:solidFill>
@@ -6315,13 +6341,27 @@
               </a:rPr>
               <a:t>Workshop Sponsors:</a:t>
             </a:r>
-            <a:endParaRPr dirty="0"/>
+            <a:endParaRPr sz="1400" b="0" i="0" u="none" strike="noStrike" cap="none">
+              <a:solidFill>
+                <a:srgbClr val="000000"/>
+              </a:solidFill>
+              <a:latin typeface="Arial"/>
+              <a:ea typeface="Arial"/>
+              <a:cs typeface="Arial"/>
+              <a:sym typeface="Arial"/>
+            </a:endParaRPr>
           </a:p>
         </p:txBody>
       </p:sp>
       <p:pic>
         <p:nvPicPr>
-          <p:cNvPr id="97" name="Google Shape;97;p5"/>
+          <p:cNvPr id="4" name="Google Shape;160;g24c7d206a1c_1_72">
+            <a:extLst>
+              <a:ext uri="{FF2B5EF4-FFF2-40B4-BE49-F238E27FC236}">
+                <a16:creationId xmlns:a16="http://schemas.microsoft.com/office/drawing/2014/main" id="{A6903722-A178-A776-2E26-C240FBB418B0}"/>
+              </a:ext>
+            </a:extLst>
+          </p:cNvPr>
           <p:cNvPicPr preferRelativeResize="0"/>
           <p:nvPr/>
         </p:nvPicPr>
@@ -6334,7 +6374,7 @@
         </p:blipFill>
         <p:spPr>
           <a:xfrm>
-            <a:off x="6845580" y="4479553"/>
+            <a:off x="8025272" y="4403978"/>
             <a:ext cx="1105775" cy="795825"/>
           </a:xfrm>
           <a:prstGeom prst="rect">
@@ -6348,7 +6388,13 @@
       </p:pic>
       <p:pic>
         <p:nvPicPr>
-          <p:cNvPr id="98" name="Google Shape;98;p5"/>
+          <p:cNvPr id="5" name="Google Shape;161;g24c7d206a1c_1_72">
+            <a:extLst>
+              <a:ext uri="{FF2B5EF4-FFF2-40B4-BE49-F238E27FC236}">
+                <a16:creationId xmlns:a16="http://schemas.microsoft.com/office/drawing/2014/main" id="{F556B781-F28E-46D3-51D2-109760019B63}"/>
+              </a:ext>
+            </a:extLst>
+          </p:cNvPr>
           <p:cNvPicPr preferRelativeResize="0"/>
           <p:nvPr/>
         </p:nvPicPr>
@@ -6361,7 +6407,7 @@
         </p:blipFill>
         <p:spPr>
           <a:xfrm>
-            <a:off x="1881259" y="4645705"/>
+            <a:off x="3060951" y="4570130"/>
             <a:ext cx="2085975" cy="590550"/>
           </a:xfrm>
           <a:prstGeom prst="rect">
@@ -6375,7 +6421,13 @@
       </p:pic>
       <p:pic>
         <p:nvPicPr>
-          <p:cNvPr id="100" name="Google Shape;100;p5"/>
+          <p:cNvPr id="6" name="Google Shape;162;g24c7d206a1c_1_72">
+            <a:extLst>
+              <a:ext uri="{FF2B5EF4-FFF2-40B4-BE49-F238E27FC236}">
+                <a16:creationId xmlns:a16="http://schemas.microsoft.com/office/drawing/2014/main" id="{C0D34EAD-1DC4-E56C-BFEE-AB1C965E5572}"/>
+              </a:ext>
+            </a:extLst>
+          </p:cNvPr>
           <p:cNvPicPr preferRelativeResize="0"/>
           <p:nvPr/>
         </p:nvPicPr>
@@ -6388,7 +6440,7 @@
         </p:blipFill>
         <p:spPr>
           <a:xfrm>
-            <a:off x="4528478" y="4319015"/>
+            <a:off x="5708169" y="4243440"/>
             <a:ext cx="1869300" cy="1243925"/>
           </a:xfrm>
           <a:prstGeom prst="rect">
@@ -6402,32 +6454,68 @@
       </p:pic>
       <p:pic>
         <p:nvPicPr>
-          <p:cNvPr id="3" name="Picture 2" descr="A picture containing graphical user interface&#10;&#10;Description automatically generated">
+          <p:cNvPr id="7" name="Google Shape;163;g24c7d206a1c_1_72" descr="A picture containing graphical user interface&#10;&#10;Description automatically generated">
             <a:extLst>
               <a:ext uri="{FF2B5EF4-FFF2-40B4-BE49-F238E27FC236}">
-                <a16:creationId xmlns:a16="http://schemas.microsoft.com/office/drawing/2014/main" id="{21E37FBC-10DF-AEEF-153F-C90C3686ED97}"/>
+                <a16:creationId xmlns:a16="http://schemas.microsoft.com/office/drawing/2014/main" id="{802ADC7C-9F1D-E226-4E5F-F718BB83A14E}"/>
               </a:ext>
             </a:extLst>
           </p:cNvPr>
-          <p:cNvPicPr>
-            <a:picLocks noChangeAspect="1"/>
-          </p:cNvPicPr>
+          <p:cNvPicPr preferRelativeResize="0"/>
           <p:nvPr/>
         </p:nvPicPr>
-        <p:blipFill>
-          <a:blip r:embed="rId6"/>
-          <a:stretch>
-            <a:fillRect/>
-          </a:stretch>
+        <p:blipFill rotWithShape="1">
+          <a:blip r:embed="rId6">
+            <a:alphaModFix/>
+          </a:blip>
+          <a:srcRect/>
+          <a:stretch/>
         </p:blipFill>
         <p:spPr>
           <a:xfrm>
-            <a:off x="8697416" y="4529349"/>
+            <a:off x="6502657" y="5353037"/>
             <a:ext cx="1143000" cy="685800"/>
           </a:xfrm>
           <a:prstGeom prst="rect">
             <a:avLst/>
           </a:prstGeom>
+          <a:noFill/>
+          <a:ln>
+            <a:noFill/>
+          </a:ln>
+        </p:spPr>
+      </p:pic>
+      <p:pic>
+        <p:nvPicPr>
+          <p:cNvPr id="8" name="Google Shape;164;g24c7d206a1c_1_72">
+            <a:extLst>
+              <a:ext uri="{FF2B5EF4-FFF2-40B4-BE49-F238E27FC236}">
+                <a16:creationId xmlns:a16="http://schemas.microsoft.com/office/drawing/2014/main" id="{F0E9305F-6B2B-2101-8DE5-C4A63799B515}"/>
+              </a:ext>
+            </a:extLst>
+          </p:cNvPr>
+          <p:cNvPicPr preferRelativeResize="0"/>
+          <p:nvPr/>
+        </p:nvPicPr>
+        <p:blipFill rotWithShape="1">
+          <a:blip r:embed="rId7">
+            <a:alphaModFix/>
+          </a:blip>
+          <a:srcRect/>
+          <a:stretch/>
+        </p:blipFill>
+        <p:spPr>
+          <a:xfrm>
+            <a:off x="4546337" y="5426596"/>
+            <a:ext cx="1311749" cy="538675"/>
+          </a:xfrm>
+          <a:prstGeom prst="rect">
+            <a:avLst/>
+          </a:prstGeom>
+          <a:noFill/>
+          <a:ln>
+            <a:noFill/>
+          </a:ln>
         </p:spPr>
       </p:pic>
     </p:spTree>

</xml_diff>

<commit_message>
fix broken strand setting link
</commit_message>
<xml_diff>
--- a/assets/lectures/cbw/2024/full/RNASeq_Module0_Introductions.pptx
+++ b/assets/lectures/cbw/2024/full/RNASeq_Module0_Introductions.pptx
@@ -268,7 +268,7 @@
               <a:pPr>
                 <a:defRPr/>
               </a:pPr>
-              <a:t>6/16/24</a:t>
+              <a:t>6/17/24</a:t>
             </a:fld>
             <a:endParaRPr lang="en-US"/>
           </a:p>
@@ -475,7 +475,7 @@
               <a:pPr>
                 <a:defRPr/>
               </a:pPr>
-              <a:t>6/16/24</a:t>
+              <a:t>6/17/24</a:t>
             </a:fld>
             <a:endParaRPr lang="en-US"/>
           </a:p>
@@ -2906,14 +2906,14 @@
           </a:ln>
           <a:extLst>
             <a:ext uri="{909E8E84-426E-40dd-AFC4-6F175D3DCCD1}">
-              <a14:hiddenFill xmlns="" xmlns:a14="http://schemas.microsoft.com/office/drawing/2010/main">
+              <a14:hiddenFill xmlns:a14="http://schemas.microsoft.com/office/drawing/2010/main" xmlns="">
                 <a:solidFill>
                   <a:srgbClr val="FFFFFF"/>
                 </a:solidFill>
               </a14:hiddenFill>
             </a:ext>
             <a:ext uri="{91240B29-F687-4f45-9708-019B960494DF}">
-              <a14:hiddenLine xmlns="" xmlns:a14="http://schemas.microsoft.com/office/drawing/2010/main" w="9525">
+              <a14:hiddenLine xmlns:a14="http://schemas.microsoft.com/office/drawing/2010/main" xmlns="" w="9525">
                 <a:solidFill>
                   <a:srgbClr val="000000"/>
                 </a:solidFill>
@@ -2923,7 +2923,7 @@
               </a14:hiddenLine>
             </a:ext>
             <a:ext uri="{FAA26D3D-D897-4be2-8F04-BA451C77F1D7}">
-              <ma14:placeholderFlag xmlns="" xmlns:ma14="http://schemas.microsoft.com/office/mac/drawingml/2011/main" val="1"/>
+              <ma14:placeholderFlag xmlns:ma14="http://schemas.microsoft.com/office/mac/drawingml/2011/main" xmlns="" val="1"/>
             </a:ext>
           </a:extLst>
         </p:spPr>
@@ -2967,14 +2967,14 @@
           </a:ln>
           <a:extLst>
             <a:ext uri="{909E8E84-426E-40dd-AFC4-6F175D3DCCD1}">
-              <a14:hiddenFill xmlns="" xmlns:a14="http://schemas.microsoft.com/office/drawing/2010/main">
+              <a14:hiddenFill xmlns:a14="http://schemas.microsoft.com/office/drawing/2010/main" xmlns="">
                 <a:solidFill>
                   <a:srgbClr val="FFFFFF"/>
                 </a:solidFill>
               </a14:hiddenFill>
             </a:ext>
             <a:ext uri="{91240B29-F687-4f45-9708-019B960494DF}">
-              <a14:hiddenLine xmlns="" xmlns:a14="http://schemas.microsoft.com/office/drawing/2010/main" w="9525">
+              <a14:hiddenLine xmlns:a14="http://schemas.microsoft.com/office/drawing/2010/main" xmlns="" w="9525">
                 <a:solidFill>
                   <a:srgbClr val="000000"/>
                 </a:solidFill>
@@ -2984,7 +2984,7 @@
               </a14:hiddenLine>
             </a:ext>
             <a:ext uri="{FAA26D3D-D897-4be2-8F04-BA451C77F1D7}">
-              <ma14:placeholderFlag xmlns="" xmlns:ma14="http://schemas.microsoft.com/office/mac/drawingml/2011/main" val="1"/>
+              <ma14:placeholderFlag xmlns:ma14="http://schemas.microsoft.com/office/mac/drawingml/2011/main" xmlns="" val="1"/>
             </a:ext>
           </a:extLst>
         </p:spPr>
@@ -3120,14 +3120,14 @@
           </a:ln>
           <a:extLst>
             <a:ext uri="{909E8E84-426E-40dd-AFC4-6F175D3DCCD1}">
-              <a14:hiddenFill xmlns="" xmlns:a14="http://schemas.microsoft.com/office/drawing/2010/main">
+              <a14:hiddenFill xmlns:a14="http://schemas.microsoft.com/office/drawing/2010/main" xmlns="">
                 <a:solidFill>
                   <a:srgbClr val="FFFFFF"/>
                 </a:solidFill>
               </a14:hiddenFill>
             </a:ext>
             <a:ext uri="{91240B29-F687-4f45-9708-019B960494DF}">
-              <a14:hiddenLine xmlns="" xmlns:a14="http://schemas.microsoft.com/office/drawing/2010/main" w="9525">
+              <a14:hiddenLine xmlns:a14="http://schemas.microsoft.com/office/drawing/2010/main" xmlns="" w="9525">
                 <a:solidFill>
                   <a:srgbClr val="000000"/>
                 </a:solidFill>
@@ -5510,7 +5510,7 @@
           <a:p>
             <a:r>
               <a:rPr lang="en-US" sz="2000" dirty="0"/>
-              <a:t>Do you consider yourself a bioinformatician?</a:t>
+              <a:t>Do you consider yourself a bioinformatician? Computational biologist?</a:t>
             </a:r>
           </a:p>
           <a:p>

</xml_diff>